<commit_message>
adding Power/Hazard modeling infrastructure tutorial and updating references on all slides
</commit_message>
<xml_diff>
--- a/CoreGenPortal/CoreGenPortalTutorial.pptx
+++ b/CoreGenPortal/CoreGenPortalTutorial.pptx
@@ -5,10 +5,10 @@
     <p:sldMasterId id="2147483696" r:id="rId1"/>
   </p:sldMasterIdLst>
   <p:notesMasterIdLst>
-    <p:notesMasterId r:id="rId24"/>
+    <p:notesMasterId r:id="rId28"/>
   </p:notesMasterIdLst>
   <p:handoutMasterIdLst>
-    <p:handoutMasterId r:id="rId25"/>
+    <p:handoutMasterId r:id="rId29"/>
   </p:handoutMasterIdLst>
   <p:sldIdLst>
     <p:sldId id="256" r:id="rId2"/>
@@ -33,6 +33,10 @@
     <p:sldId id="410" r:id="rId21"/>
     <p:sldId id="411" r:id="rId22"/>
     <p:sldId id="412" r:id="rId23"/>
+    <p:sldId id="424" r:id="rId24"/>
+    <p:sldId id="425" r:id="rId25"/>
+    <p:sldId id="426" r:id="rId26"/>
+    <p:sldId id="427" r:id="rId27"/>
   </p:sldIdLst>
   <p:sldSz cx="12192000" cy="6858000"/>
   <p:notesSz cx="6858000" cy="9144000"/>
@@ -236,7 +240,7 @@
           <a:p>
             <a:fld id="{105F462E-3B3F-2740-A7A5-EF9DCFF426BA}" type="datetimeFigureOut">
               <a:rPr lang="en-US" smtClean="0"/>
-              <a:t>10/17/19</a:t>
+              <a:t>9/13/22</a:t>
             </a:fld>
             <a:endParaRPr lang="en-US"/>
           </a:p>
@@ -413,7 +417,7 @@
           <a:p>
             <a:fld id="{54BE5993-E962-314F-922D-09C00B8018FF}" type="datetimeFigureOut">
               <a:rPr lang="en-US" smtClean="0"/>
-              <a:t>10/17/19</a:t>
+              <a:t>9/13/22</a:t>
             </a:fld>
             <a:endParaRPr lang="en-US"/>
           </a:p>
@@ -811,7 +815,7 @@
           <a:p>
             <a:fld id="{3375749C-D813-A541-AFF6-E0E709C1677A}" type="datetime1">
               <a:rPr lang="en-US" smtClean="0"/>
-              <a:t>10/17/19</a:t>
+              <a:t>9/13/22</a:t>
             </a:fld>
             <a:endParaRPr lang="en-US"/>
           </a:p>
@@ -1020,7 +1024,7 @@
           <a:p>
             <a:fld id="{48C72CAE-D587-2B42-A820-7DC5AFD79821}" type="datetime1">
               <a:rPr lang="en-US" smtClean="0"/>
-              <a:t>10/17/19</a:t>
+              <a:t>9/13/22</a:t>
             </a:fld>
             <a:endParaRPr lang="en-US"/>
           </a:p>
@@ -1239,7 +1243,7 @@
           <a:p>
             <a:fld id="{B9D3EC91-870B-F045-83B9-A90AD7B133B4}" type="datetime1">
               <a:rPr lang="en-US" smtClean="0"/>
-              <a:t>10/17/19</a:t>
+              <a:t>9/13/22</a:t>
             </a:fld>
             <a:endParaRPr lang="en-US"/>
           </a:p>
@@ -1448,7 +1452,7 @@
           <a:p>
             <a:fld id="{9C211B43-FB2F-BF44-8571-8949917BA74D}" type="datetime1">
               <a:rPr lang="en-US" smtClean="0"/>
-              <a:t>10/17/19</a:t>
+              <a:t>9/13/22</a:t>
             </a:fld>
             <a:endParaRPr lang="en-US"/>
           </a:p>
@@ -1733,7 +1737,7 @@
           <a:p>
             <a:fld id="{5DD8F2BC-0E0D-CB45-BFB8-B1CE361DBACE}" type="datetime1">
               <a:rPr lang="en-US" smtClean="0"/>
-              <a:t>10/17/19</a:t>
+              <a:t>9/13/22</a:t>
             </a:fld>
             <a:endParaRPr lang="en-US"/>
           </a:p>
@@ -2004,7 +2008,7 @@
           <a:p>
             <a:fld id="{C0AE0991-E64A-0A43-B09D-7644253DA61C}" type="datetime1">
               <a:rPr lang="en-US" smtClean="0"/>
-              <a:t>10/17/19</a:t>
+              <a:t>9/13/22</a:t>
             </a:fld>
             <a:endParaRPr lang="en-US"/>
           </a:p>
@@ -2410,7 +2414,7 @@
           <a:p>
             <a:fld id="{51E9D6CD-6096-D743-83B6-9C21BBF7AA7F}" type="datetime1">
               <a:rPr lang="en-US" smtClean="0"/>
-              <a:t>10/17/19</a:t>
+              <a:t>9/13/22</a:t>
             </a:fld>
             <a:endParaRPr lang="en-US"/>
           </a:p>
@@ -2567,7 +2571,7 @@
           <a:p>
             <a:fld id="{2A4DA997-4B2F-9F47-8DFD-B28EFC01BE1F}" type="datetime1">
               <a:rPr lang="en-US" smtClean="0"/>
-              <a:t>10/17/19</a:t>
+              <a:t>9/13/22</a:t>
             </a:fld>
             <a:endParaRPr lang="en-US"/>
           </a:p>
@@ -2701,7 +2705,7 @@
           <a:p>
             <a:fld id="{4A17B195-DDF7-0D4C-AFF9-525BB5227ADC}" type="datetime1">
               <a:rPr lang="en-US" smtClean="0"/>
-              <a:t>10/17/19</a:t>
+              <a:t>9/13/22</a:t>
             </a:fld>
             <a:endParaRPr lang="en-US"/>
           </a:p>
@@ -3017,7 +3021,7 @@
           <a:p>
             <a:fld id="{88C4D72D-DC2E-7F4D-B137-3B335F9D8B92}" type="datetime1">
               <a:rPr lang="en-US" smtClean="0"/>
-              <a:t>10/17/19</a:t>
+              <a:t>9/13/22</a:t>
             </a:fld>
             <a:endParaRPr lang="en-US"/>
           </a:p>
@@ -3313,7 +3317,7 @@
           <a:p>
             <a:fld id="{20C307A9-1BDC-E340-8DF6-54487D3BF7EA}" type="datetime1">
               <a:rPr lang="en-US" smtClean="0"/>
-              <a:t>10/17/19</a:t>
+              <a:t>9/13/22</a:t>
             </a:fld>
             <a:endParaRPr lang="en-US"/>
           </a:p>
@@ -3565,7 +3569,7 @@
           <a:p>
             <a:fld id="{759408AA-0BFA-D047-99E2-C9895342493A}" type="datetime1">
               <a:rPr lang="en-US" smtClean="0"/>
-              <a:t>10/17/19</a:t>
+              <a:t>9/13/22</a:t>
             </a:fld>
             <a:endParaRPr lang="en-US"/>
           </a:p>
@@ -4039,13 +4043,13 @@
           <a:p>
             <a:r>
               <a:rPr lang="en-US" dirty="0"/>
-              <a:t>Frank Conlon</a:t>
+              <a:t>John Leidel</a:t>
             </a:r>
           </a:p>
           <a:p>
             <a:r>
               <a:rPr lang="en-US" dirty="0"/>
-              <a:t>Research Engineer, Tactical Computing Laboratories</a:t>
+              <a:t>Chief Scientist, Tactical Computing Laboratories</a:t>
             </a:r>
           </a:p>
           <a:p>
@@ -4055,7 +4059,7 @@
             </a:r>
             <a:r>
               <a:rPr lang="en-US" dirty="0"/>
-              <a:t> 2019.10.17</a:t>
+              <a:t> 2022.09.13</a:t>
             </a:r>
           </a:p>
         </p:txBody>
@@ -7999,6 +8003,793 @@
   </p:cSld>
   <p:clrMapOvr>
     <a:overrideClrMapping bg1="dk1" tx1="lt1" bg2="dk2" tx2="lt2" accent1="accent1" accent2="accent2" accent3="accent3" accent4="accent4" accent5="accent5" accent6="accent6" hlink="hlink" folHlink="folHlink"/>
+  </p:clrMapOvr>
+</p:sld>
+</file>
+
+<file path=ppt/slides/slide23.xml><?xml version="1.0" encoding="utf-8"?>
+<p:sld xmlns:a="http://schemas.openxmlformats.org/drawingml/2006/main" xmlns:r="http://schemas.openxmlformats.org/officeDocument/2006/relationships" xmlns:p="http://schemas.openxmlformats.org/presentationml/2006/main">
+  <p:cSld>
+    <p:spTree>
+      <p:nvGrpSpPr>
+        <p:cNvPr id="1" name=""/>
+        <p:cNvGrpSpPr/>
+        <p:nvPr/>
+      </p:nvGrpSpPr>
+      <p:grpSpPr>
+        <a:xfrm>
+          <a:off x="0" y="0"/>
+          <a:ext cx="0" cy="0"/>
+          <a:chOff x="0" y="0"/>
+          <a:chExt cx="0" cy="0"/>
+        </a:xfrm>
+      </p:grpSpPr>
+      <p:sp>
+        <p:nvSpPr>
+          <p:cNvPr id="2" name="Title 1">
+            <a:extLst>
+              <a:ext uri="{FF2B5EF4-FFF2-40B4-BE49-F238E27FC236}">
+                <a16:creationId xmlns:a16="http://schemas.microsoft.com/office/drawing/2014/main" id="{B4C776BE-D3A2-E84F-B294-72DD66AC59DE}"/>
+              </a:ext>
+            </a:extLst>
+          </p:cNvPr>
+          <p:cNvSpPr>
+            <a:spLocks noGrp="1"/>
+          </p:cNvSpPr>
+          <p:nvPr>
+            <p:ph type="title"/>
+          </p:nvPr>
+        </p:nvSpPr>
+        <p:spPr/>
+        <p:txBody>
+          <a:bodyPr/>
+          <a:lstStyle/>
+          <a:p>
+            <a:r>
+              <a:rPr lang="en-US" dirty="0"/>
+              <a:t>References</a:t>
+            </a:r>
+          </a:p>
+        </p:txBody>
+      </p:sp>
+      <p:sp>
+        <p:nvSpPr>
+          <p:cNvPr id="3" name="Text Placeholder 2">
+            <a:extLst>
+              <a:ext uri="{FF2B5EF4-FFF2-40B4-BE49-F238E27FC236}">
+                <a16:creationId xmlns:a16="http://schemas.microsoft.com/office/drawing/2014/main" id="{CFC7047C-458B-8545-A383-FD2E35B1A567}"/>
+              </a:ext>
+            </a:extLst>
+          </p:cNvPr>
+          <p:cNvSpPr>
+            <a:spLocks noGrp="1"/>
+          </p:cNvSpPr>
+          <p:nvPr>
+            <p:ph type="body" idx="1"/>
+          </p:nvPr>
+        </p:nvSpPr>
+        <p:spPr/>
+        <p:txBody>
+          <a:bodyPr/>
+          <a:lstStyle/>
+          <a:p>
+            <a:r>
+              <a:rPr lang="en-US" dirty="0"/>
+              <a:t>Where do I find more info?</a:t>
+            </a:r>
+          </a:p>
+        </p:txBody>
+      </p:sp>
+      <p:sp>
+        <p:nvSpPr>
+          <p:cNvPr id="4" name="Footer Placeholder 3">
+            <a:extLst>
+              <a:ext uri="{FF2B5EF4-FFF2-40B4-BE49-F238E27FC236}">
+                <a16:creationId xmlns:a16="http://schemas.microsoft.com/office/drawing/2014/main" id="{71591848-AA9D-B04F-AEDB-EDF700EBAF2B}"/>
+              </a:ext>
+            </a:extLst>
+          </p:cNvPr>
+          <p:cNvSpPr>
+            <a:spLocks noGrp="1"/>
+          </p:cNvSpPr>
+          <p:nvPr>
+            <p:ph type="ftr" sz="quarter" idx="11"/>
+          </p:nvPr>
+        </p:nvSpPr>
+        <p:spPr/>
+        <p:txBody>
+          <a:bodyPr/>
+          <a:lstStyle/>
+          <a:p>
+            <a:r>
+              <a:rPr lang="en-US"/>
+              <a:t>Tactical Computing Laboratories</a:t>
+            </a:r>
+            <a:endParaRPr lang="en-US" dirty="0"/>
+          </a:p>
+        </p:txBody>
+      </p:sp>
+    </p:spTree>
+    <p:extLst>
+      <p:ext uri="{BB962C8B-B14F-4D97-AF65-F5344CB8AC3E}">
+        <p14:creationId xmlns:p14="http://schemas.microsoft.com/office/powerpoint/2010/main" val="764394306"/>
+      </p:ext>
+    </p:extLst>
+  </p:cSld>
+  <p:clrMapOvr>
+    <a:masterClrMapping/>
+  </p:clrMapOvr>
+</p:sld>
+</file>
+
+<file path=ppt/slides/slide24.xml><?xml version="1.0" encoding="utf-8"?>
+<p:sld xmlns:a="http://schemas.openxmlformats.org/drawingml/2006/main" xmlns:r="http://schemas.openxmlformats.org/officeDocument/2006/relationships" xmlns:p="http://schemas.openxmlformats.org/presentationml/2006/main">
+  <p:cSld>
+    <p:spTree>
+      <p:nvGrpSpPr>
+        <p:cNvPr id="1" name=""/>
+        <p:cNvGrpSpPr/>
+        <p:nvPr/>
+      </p:nvGrpSpPr>
+      <p:grpSpPr>
+        <a:xfrm>
+          <a:off x="0" y="0"/>
+          <a:ext cx="0" cy="0"/>
+          <a:chOff x="0" y="0"/>
+          <a:chExt cx="0" cy="0"/>
+        </a:xfrm>
+      </p:grpSpPr>
+      <p:sp>
+        <p:nvSpPr>
+          <p:cNvPr id="5" name="Title 4">
+            <a:extLst>
+              <a:ext uri="{FF2B5EF4-FFF2-40B4-BE49-F238E27FC236}">
+                <a16:creationId xmlns:a16="http://schemas.microsoft.com/office/drawing/2014/main" id="{D1948FB5-3EEF-DF44-B37D-B198B0F9FE24}"/>
+              </a:ext>
+            </a:extLst>
+          </p:cNvPr>
+          <p:cNvSpPr>
+            <a:spLocks noGrp="1"/>
+          </p:cNvSpPr>
+          <p:nvPr>
+            <p:ph type="title"/>
+          </p:nvPr>
+        </p:nvSpPr>
+        <p:spPr/>
+        <p:txBody>
+          <a:bodyPr/>
+          <a:lstStyle/>
+          <a:p>
+            <a:r>
+              <a:rPr lang="en-US" dirty="0"/>
+              <a:t>Web Links</a:t>
+            </a:r>
+          </a:p>
+        </p:txBody>
+      </p:sp>
+      <p:sp>
+        <p:nvSpPr>
+          <p:cNvPr id="6" name="Content Placeholder 5">
+            <a:extLst>
+              <a:ext uri="{FF2B5EF4-FFF2-40B4-BE49-F238E27FC236}">
+                <a16:creationId xmlns:a16="http://schemas.microsoft.com/office/drawing/2014/main" id="{E85D9A59-F8F3-6943-AEFC-3134E70689DB}"/>
+              </a:ext>
+            </a:extLst>
+          </p:cNvPr>
+          <p:cNvSpPr>
+            <a:spLocks noGrp="1"/>
+          </p:cNvSpPr>
+          <p:nvPr>
+            <p:ph idx="1"/>
+          </p:nvPr>
+        </p:nvSpPr>
+        <p:spPr/>
+        <p:txBody>
+          <a:bodyPr>
+            <a:normAutofit/>
+          </a:bodyPr>
+          <a:lstStyle/>
+          <a:p>
+            <a:r>
+              <a:rPr lang="en-US" dirty="0"/>
+              <a:t>System Architect Public Web</a:t>
+            </a:r>
+          </a:p>
+          <a:p>
+            <a:pPr lvl="1"/>
+            <a:r>
+              <a:rPr lang="en-US" dirty="0">
+                <a:hlinkClick r:id="rId2"/>
+              </a:rPr>
+              <a:t>http://www.systemarchitect.tech/</a:t>
+            </a:r>
+            <a:endParaRPr lang="en-US" dirty="0"/>
+          </a:p>
+          <a:p>
+            <a:pPr marL="457200" lvl="1" indent="0">
+              <a:buNone/>
+            </a:pPr>
+            <a:endParaRPr lang="en-US" dirty="0"/>
+          </a:p>
+          <a:p>
+            <a:r>
+              <a:rPr lang="en-US" dirty="0"/>
+              <a:t>Documentation</a:t>
+            </a:r>
+          </a:p>
+          <a:p>
+            <a:pPr lvl="1"/>
+            <a:r>
+              <a:rPr lang="en-US" dirty="0"/>
+              <a:t>Latest </a:t>
+            </a:r>
+            <a:r>
+              <a:rPr lang="en-US" dirty="0" err="1"/>
+              <a:t>StoneCutter</a:t>
+            </a:r>
+            <a:r>
+              <a:rPr lang="en-US" dirty="0"/>
+              <a:t> Specification:</a:t>
+            </a:r>
+          </a:p>
+          <a:p>
+            <a:pPr lvl="2"/>
+            <a:r>
+              <a:rPr lang="en-US" dirty="0">
+                <a:hlinkClick r:id="rId3"/>
+              </a:rPr>
+              <a:t>http://www.systemarchitect.tech/index.php/stonecutter-language-spec/</a:t>
+            </a:r>
+            <a:endParaRPr lang="en-US" dirty="0"/>
+          </a:p>
+          <a:p>
+            <a:r>
+              <a:rPr lang="en-US" dirty="0"/>
+              <a:t>Tutorials</a:t>
+            </a:r>
+          </a:p>
+          <a:p>
+            <a:pPr lvl="1"/>
+            <a:r>
+              <a:rPr lang="en-US" dirty="0">
+                <a:hlinkClick r:id="rId4"/>
+              </a:rPr>
+              <a:t>http://www.systemarchitect.tech/index.php/tutorials/</a:t>
+            </a:r>
+            <a:endParaRPr lang="en-US" dirty="0"/>
+          </a:p>
+          <a:p>
+            <a:pPr lvl="1"/>
+            <a:r>
+              <a:rPr lang="en-US" dirty="0">
+                <a:hlinkClick r:id="rId5"/>
+              </a:rPr>
+              <a:t>https://github.com/opensocsysarch/CoreGenTutorials</a:t>
+            </a:r>
+            <a:endParaRPr lang="en-US" dirty="0"/>
+          </a:p>
+          <a:p>
+            <a:pPr marL="457200" lvl="1" indent="0">
+              <a:buNone/>
+            </a:pPr>
+            <a:endParaRPr lang="en-US" dirty="0"/>
+          </a:p>
+          <a:p>
+            <a:pPr marL="457200" lvl="1" indent="0">
+              <a:buNone/>
+            </a:pPr>
+            <a:endParaRPr lang="en-US" dirty="0"/>
+          </a:p>
+          <a:p>
+            <a:pPr marL="914400" lvl="2" indent="0">
+              <a:buNone/>
+            </a:pPr>
+            <a:endParaRPr lang="en-US" dirty="0"/>
+          </a:p>
+        </p:txBody>
+      </p:sp>
+      <p:sp>
+        <p:nvSpPr>
+          <p:cNvPr id="4" name="Footer Placeholder 3">
+            <a:extLst>
+              <a:ext uri="{FF2B5EF4-FFF2-40B4-BE49-F238E27FC236}">
+                <a16:creationId xmlns:a16="http://schemas.microsoft.com/office/drawing/2014/main" id="{5418FB87-5039-CC4A-9F56-88AA23757070}"/>
+              </a:ext>
+            </a:extLst>
+          </p:cNvPr>
+          <p:cNvSpPr>
+            <a:spLocks noGrp="1"/>
+          </p:cNvSpPr>
+          <p:nvPr>
+            <p:ph type="ftr" sz="quarter" idx="11"/>
+          </p:nvPr>
+        </p:nvSpPr>
+        <p:spPr/>
+        <p:txBody>
+          <a:bodyPr/>
+          <a:lstStyle/>
+          <a:p>
+            <a:r>
+              <a:rPr lang="en-US"/>
+              <a:t>Tactical Computing Laboratories</a:t>
+            </a:r>
+            <a:endParaRPr lang="en-US" dirty="0"/>
+          </a:p>
+        </p:txBody>
+      </p:sp>
+    </p:spTree>
+    <p:extLst>
+      <p:ext uri="{BB962C8B-B14F-4D97-AF65-F5344CB8AC3E}">
+        <p14:creationId xmlns:p14="http://schemas.microsoft.com/office/powerpoint/2010/main" val="3477778848"/>
+      </p:ext>
+    </p:extLst>
+  </p:cSld>
+  <p:clrMapOvr>
+    <a:masterClrMapping/>
+  </p:clrMapOvr>
+</p:sld>
+</file>
+
+<file path=ppt/slides/slide25.xml><?xml version="1.0" encoding="utf-8"?>
+<p:sld xmlns:a="http://schemas.openxmlformats.org/drawingml/2006/main" xmlns:r="http://schemas.openxmlformats.org/officeDocument/2006/relationships" xmlns:p="http://schemas.openxmlformats.org/presentationml/2006/main">
+  <p:cSld>
+    <p:spTree>
+      <p:nvGrpSpPr>
+        <p:cNvPr id="1" name=""/>
+        <p:cNvGrpSpPr/>
+        <p:nvPr/>
+      </p:nvGrpSpPr>
+      <p:grpSpPr>
+        <a:xfrm>
+          <a:off x="0" y="0"/>
+          <a:ext cx="0" cy="0"/>
+          <a:chOff x="0" y="0"/>
+          <a:chExt cx="0" cy="0"/>
+        </a:xfrm>
+      </p:grpSpPr>
+      <p:sp>
+        <p:nvSpPr>
+          <p:cNvPr id="2" name="Title 1">
+            <a:extLst>
+              <a:ext uri="{FF2B5EF4-FFF2-40B4-BE49-F238E27FC236}">
+                <a16:creationId xmlns:a16="http://schemas.microsoft.com/office/drawing/2014/main" id="{93A50769-97F0-2745-928F-F2E4EC3FE10A}"/>
+              </a:ext>
+            </a:extLst>
+          </p:cNvPr>
+          <p:cNvSpPr>
+            <a:spLocks noGrp="1"/>
+          </p:cNvSpPr>
+          <p:nvPr>
+            <p:ph type="title"/>
+          </p:nvPr>
+        </p:nvSpPr>
+        <p:spPr/>
+        <p:txBody>
+          <a:bodyPr/>
+          <a:lstStyle/>
+          <a:p>
+            <a:r>
+              <a:rPr lang="en-US" dirty="0"/>
+              <a:t>Source Code</a:t>
+            </a:r>
+          </a:p>
+        </p:txBody>
+      </p:sp>
+      <p:sp>
+        <p:nvSpPr>
+          <p:cNvPr id="3" name="Content Placeholder 2">
+            <a:extLst>
+              <a:ext uri="{FF2B5EF4-FFF2-40B4-BE49-F238E27FC236}">
+                <a16:creationId xmlns:a16="http://schemas.microsoft.com/office/drawing/2014/main" id="{B86AEA14-6A08-8B41-BEA6-1A8F4E954EFF}"/>
+              </a:ext>
+            </a:extLst>
+          </p:cNvPr>
+          <p:cNvSpPr>
+            <a:spLocks noGrp="1"/>
+          </p:cNvSpPr>
+          <p:nvPr>
+            <p:ph idx="1"/>
+          </p:nvPr>
+        </p:nvSpPr>
+        <p:spPr/>
+        <p:txBody>
+          <a:bodyPr>
+            <a:normAutofit fontScale="85000" lnSpcReduction="20000"/>
+          </a:bodyPr>
+          <a:lstStyle/>
+          <a:p>
+            <a:r>
+              <a:rPr lang="en-US" dirty="0"/>
+              <a:t>Main source code hosted on </a:t>
+            </a:r>
+            <a:r>
+              <a:rPr lang="en-US" dirty="0" err="1"/>
+              <a:t>Github</a:t>
+            </a:r>
+            <a:r>
+              <a:rPr lang="en-US" dirty="0"/>
+              <a:t>:</a:t>
+            </a:r>
+          </a:p>
+          <a:p>
+            <a:pPr lvl="1"/>
+            <a:r>
+              <a:rPr lang="en-US" dirty="0">
+                <a:hlinkClick r:id="rId2"/>
+              </a:rPr>
+              <a:t>https://github.com/opensocsysarch</a:t>
+            </a:r>
+            <a:endParaRPr lang="en-US" dirty="0"/>
+          </a:p>
+          <a:p>
+            <a:endParaRPr lang="en-US" dirty="0"/>
+          </a:p>
+          <a:p>
+            <a:r>
+              <a:rPr lang="en-US" dirty="0" err="1"/>
+              <a:t>CoreGen</a:t>
+            </a:r>
+            <a:r>
+              <a:rPr lang="en-US" dirty="0"/>
+              <a:t> Infrastructure</a:t>
+            </a:r>
+          </a:p>
+          <a:p>
+            <a:pPr lvl="1"/>
+            <a:r>
+              <a:rPr lang="en-US" dirty="0">
+                <a:hlinkClick r:id="rId3"/>
+              </a:rPr>
+              <a:t>https://github.com/opensocsysarch/CoreGen</a:t>
+            </a:r>
+            <a:endParaRPr lang="en-US" dirty="0"/>
+          </a:p>
+          <a:p>
+            <a:r>
+              <a:rPr lang="en-US" dirty="0" err="1"/>
+              <a:t>CoreGenPortal</a:t>
+            </a:r>
+            <a:r>
+              <a:rPr lang="en-US" dirty="0"/>
+              <a:t> GUI</a:t>
+            </a:r>
+          </a:p>
+          <a:p>
+            <a:pPr lvl="1"/>
+            <a:r>
+              <a:rPr lang="en-US" dirty="0">
+                <a:hlinkClick r:id="rId4"/>
+              </a:rPr>
+              <a:t>https://github.com/opensocsysarch/CoreGenPortal</a:t>
+            </a:r>
+            <a:endParaRPr lang="en-US" dirty="0"/>
+          </a:p>
+          <a:p>
+            <a:r>
+              <a:rPr lang="en-US" dirty="0" err="1"/>
+              <a:t>CoreGen</a:t>
+            </a:r>
+            <a:r>
+              <a:rPr lang="en-US" dirty="0"/>
+              <a:t> IR Spec</a:t>
+            </a:r>
+          </a:p>
+          <a:p>
+            <a:pPr lvl="1"/>
+            <a:r>
+              <a:rPr lang="en-US" dirty="0">
+                <a:hlinkClick r:id="rId5"/>
+              </a:rPr>
+              <a:t>https://github.com/opensocsysarch/CoreGenIRSpec</a:t>
+            </a:r>
+            <a:endParaRPr lang="en-US" dirty="0"/>
+          </a:p>
+          <a:p>
+            <a:r>
+              <a:rPr lang="en-US" dirty="0" err="1"/>
+              <a:t>StoneCutter</a:t>
+            </a:r>
+            <a:r>
+              <a:rPr lang="en-US" dirty="0"/>
+              <a:t> Language Spec</a:t>
+            </a:r>
+          </a:p>
+          <a:p>
+            <a:pPr lvl="1"/>
+            <a:r>
+              <a:rPr lang="en-US" dirty="0">
+                <a:hlinkClick r:id="rId6"/>
+              </a:rPr>
+              <a:t>https://github.com/opensysarch/StoneCutterLanguageSpec</a:t>
+            </a:r>
+            <a:endParaRPr lang="en-US" dirty="0"/>
+          </a:p>
+          <a:p>
+            <a:r>
+              <a:rPr lang="en-US" dirty="0"/>
+              <a:t>System Architect Weekly Development Releases</a:t>
+            </a:r>
+          </a:p>
+          <a:p>
+            <a:pPr lvl="1"/>
+            <a:r>
+              <a:rPr lang="en-US" dirty="0">
+                <a:hlinkClick r:id="rId7"/>
+              </a:rPr>
+              <a:t>https://github.com/opensocsysarch/SystemArchitectRelease</a:t>
+            </a:r>
+            <a:endParaRPr lang="en-US" dirty="0"/>
+          </a:p>
+        </p:txBody>
+      </p:sp>
+      <p:sp>
+        <p:nvSpPr>
+          <p:cNvPr id="4" name="Footer Placeholder 3">
+            <a:extLst>
+              <a:ext uri="{FF2B5EF4-FFF2-40B4-BE49-F238E27FC236}">
+                <a16:creationId xmlns:a16="http://schemas.microsoft.com/office/drawing/2014/main" id="{4B0B9653-E78F-5542-8508-8D38C40E5ACF}"/>
+              </a:ext>
+            </a:extLst>
+          </p:cNvPr>
+          <p:cNvSpPr>
+            <a:spLocks noGrp="1"/>
+          </p:cNvSpPr>
+          <p:nvPr>
+            <p:ph type="ftr" sz="quarter" idx="11"/>
+          </p:nvPr>
+        </p:nvSpPr>
+        <p:spPr/>
+        <p:txBody>
+          <a:bodyPr/>
+          <a:lstStyle/>
+          <a:p>
+            <a:r>
+              <a:rPr lang="en-US"/>
+              <a:t>Tactical Computing Laboratories</a:t>
+            </a:r>
+            <a:endParaRPr lang="en-US" dirty="0"/>
+          </a:p>
+        </p:txBody>
+      </p:sp>
+    </p:spTree>
+    <p:extLst>
+      <p:ext uri="{BB962C8B-B14F-4D97-AF65-F5344CB8AC3E}">
+        <p14:creationId xmlns:p14="http://schemas.microsoft.com/office/powerpoint/2010/main" val="2376382893"/>
+      </p:ext>
+    </p:extLst>
+  </p:cSld>
+  <p:clrMapOvr>
+    <a:masterClrMapping/>
+  </p:clrMapOvr>
+</p:sld>
+</file>
+
+<file path=ppt/slides/slide26.xml><?xml version="1.0" encoding="utf-8"?>
+<p:sld xmlns:a="http://schemas.openxmlformats.org/drawingml/2006/main" xmlns:r="http://schemas.openxmlformats.org/officeDocument/2006/relationships" xmlns:p="http://schemas.openxmlformats.org/presentationml/2006/main">
+  <p:cSld>
+    <p:spTree>
+      <p:nvGrpSpPr>
+        <p:cNvPr id="1" name=""/>
+        <p:cNvGrpSpPr/>
+        <p:nvPr/>
+      </p:nvGrpSpPr>
+      <p:grpSpPr>
+        <a:xfrm>
+          <a:off x="0" y="0"/>
+          <a:ext cx="0" cy="0"/>
+          <a:chOff x="0" y="0"/>
+          <a:chExt cx="0" cy="0"/>
+        </a:xfrm>
+      </p:grpSpPr>
+      <p:sp>
+        <p:nvSpPr>
+          <p:cNvPr id="2" name="Title 1">
+            <a:extLst>
+              <a:ext uri="{FF2B5EF4-FFF2-40B4-BE49-F238E27FC236}">
+                <a16:creationId xmlns:a16="http://schemas.microsoft.com/office/drawing/2014/main" id="{5C62A3D5-86A8-3142-97A2-C58F00BA4B09}"/>
+              </a:ext>
+            </a:extLst>
+          </p:cNvPr>
+          <p:cNvSpPr>
+            <a:spLocks noGrp="1"/>
+          </p:cNvSpPr>
+          <p:nvPr>
+            <p:ph type="title"/>
+          </p:nvPr>
+        </p:nvSpPr>
+        <p:spPr/>
+        <p:txBody>
+          <a:bodyPr/>
+          <a:lstStyle/>
+          <a:p>
+            <a:r>
+              <a:rPr lang="en-US" dirty="0"/>
+              <a:t>Contact</a:t>
+            </a:r>
+          </a:p>
+        </p:txBody>
+      </p:sp>
+      <p:sp>
+        <p:nvSpPr>
+          <p:cNvPr id="3" name="Content Placeholder 2">
+            <a:extLst>
+              <a:ext uri="{FF2B5EF4-FFF2-40B4-BE49-F238E27FC236}">
+                <a16:creationId xmlns:a16="http://schemas.microsoft.com/office/drawing/2014/main" id="{169FDAAA-4885-6A45-BD11-4180A1F5C178}"/>
+              </a:ext>
+            </a:extLst>
+          </p:cNvPr>
+          <p:cNvSpPr>
+            <a:spLocks noGrp="1"/>
+          </p:cNvSpPr>
+          <p:nvPr>
+            <p:ph idx="1"/>
+          </p:nvPr>
+        </p:nvSpPr>
+        <p:spPr/>
+        <p:txBody>
+          <a:bodyPr>
+            <a:normAutofit lnSpcReduction="10000"/>
+          </a:bodyPr>
+          <a:lstStyle/>
+          <a:p>
+            <a:r>
+              <a:rPr lang="en-US" dirty="0"/>
+              <a:t>Issues should be submitted through the respective </a:t>
+            </a:r>
+            <a:r>
+              <a:rPr lang="en-US" dirty="0" err="1"/>
+              <a:t>Github</a:t>
+            </a:r>
+            <a:r>
+              <a:rPr lang="en-US" dirty="0"/>
+              <a:t> issues pages (see source code links)</a:t>
+            </a:r>
+          </a:p>
+          <a:p>
+            <a:endParaRPr lang="en-US" dirty="0"/>
+          </a:p>
+          <a:p>
+            <a:r>
+              <a:rPr lang="en-US" dirty="0"/>
+              <a:t>Mailing Lists:</a:t>
+            </a:r>
+          </a:p>
+          <a:p>
+            <a:pPr lvl="1"/>
+            <a:r>
+              <a:rPr lang="en-US" dirty="0">
+                <a:hlinkClick r:id="rId2"/>
+              </a:rPr>
+              <a:t>http://www.systemarchitect.tech/index.php/lists/</a:t>
+            </a:r>
+            <a:endParaRPr lang="en-US" dirty="0"/>
+          </a:p>
+          <a:p>
+            <a:endParaRPr lang="en-US" dirty="0"/>
+          </a:p>
+          <a:p>
+            <a:r>
+              <a:rPr lang="en-US" dirty="0"/>
+              <a:t>Direct developer contacts</a:t>
+            </a:r>
+          </a:p>
+          <a:p>
+            <a:pPr lvl="1"/>
+            <a:r>
+              <a:rPr lang="en-US" dirty="0"/>
+              <a:t>John Leidel: </a:t>
+            </a:r>
+            <a:r>
+              <a:rPr lang="en-US" dirty="0" err="1"/>
+              <a:t>jleidel</a:t>
+            </a:r>
+            <a:r>
+              <a:rPr lang="en-US" dirty="0"/>
+              <a:t>&lt;at&gt;</a:t>
+            </a:r>
+            <a:r>
+              <a:rPr lang="en-US" dirty="0" err="1"/>
+              <a:t>tactcomplabs</a:t>
+            </a:r>
+            <a:r>
+              <a:rPr lang="en-US" dirty="0"/>
+              <a:t>&lt;dot&gt;com</a:t>
+            </a:r>
+          </a:p>
+          <a:p>
+            <a:pPr lvl="1"/>
+            <a:r>
+              <a:rPr lang="en-US" dirty="0"/>
+              <a:t>David Donofrio: </a:t>
+            </a:r>
+            <a:r>
+              <a:rPr lang="en-US" dirty="0" err="1"/>
+              <a:t>ddonofrio</a:t>
+            </a:r>
+            <a:r>
+              <a:rPr lang="en-US" dirty="0"/>
+              <a:t>&lt;at&gt;</a:t>
+            </a:r>
+            <a:r>
+              <a:rPr lang="en-US" dirty="0" err="1"/>
+              <a:t>tactcomplabs</a:t>
+            </a:r>
+            <a:r>
+              <a:rPr lang="en-US" dirty="0"/>
+              <a:t>&lt;dot&gt;com</a:t>
+            </a:r>
+          </a:p>
+          <a:p>
+            <a:pPr lvl="1"/>
+            <a:r>
+              <a:rPr lang="en-US" dirty="0"/>
+              <a:t>Ryan </a:t>
+            </a:r>
+            <a:r>
+              <a:rPr lang="en-US" dirty="0" err="1"/>
+              <a:t>Kabrick</a:t>
+            </a:r>
+            <a:r>
+              <a:rPr lang="en-US" dirty="0"/>
+              <a:t>: </a:t>
+            </a:r>
+            <a:r>
+              <a:rPr lang="en-US" dirty="0" err="1"/>
+              <a:t>rkabrick</a:t>
+            </a:r>
+            <a:r>
+              <a:rPr lang="en-US" dirty="0"/>
+              <a:t>&lt;at&gt;</a:t>
+            </a:r>
+            <a:r>
+              <a:rPr lang="en-US" dirty="0" err="1"/>
+              <a:t>tactcomplabs</a:t>
+            </a:r>
+            <a:r>
+              <a:rPr lang="en-US" dirty="0"/>
+              <a:t>&lt;dot&gt;com</a:t>
+            </a:r>
+          </a:p>
+        </p:txBody>
+      </p:sp>
+      <p:sp>
+        <p:nvSpPr>
+          <p:cNvPr id="4" name="Footer Placeholder 3">
+            <a:extLst>
+              <a:ext uri="{FF2B5EF4-FFF2-40B4-BE49-F238E27FC236}">
+                <a16:creationId xmlns:a16="http://schemas.microsoft.com/office/drawing/2014/main" id="{E81F6E9E-A760-FA42-BDFE-1396EC575296}"/>
+              </a:ext>
+            </a:extLst>
+          </p:cNvPr>
+          <p:cNvSpPr>
+            <a:spLocks noGrp="1"/>
+          </p:cNvSpPr>
+          <p:nvPr>
+            <p:ph type="ftr" sz="quarter" idx="11"/>
+          </p:nvPr>
+        </p:nvSpPr>
+        <p:spPr/>
+        <p:txBody>
+          <a:bodyPr/>
+          <a:lstStyle/>
+          <a:p>
+            <a:r>
+              <a:rPr lang="en-US"/>
+              <a:t>Tactical Computing Laboratories</a:t>
+            </a:r>
+            <a:endParaRPr lang="en-US" dirty="0"/>
+          </a:p>
+        </p:txBody>
+      </p:sp>
+    </p:spTree>
+    <p:extLst>
+      <p:ext uri="{BB962C8B-B14F-4D97-AF65-F5344CB8AC3E}">
+        <p14:creationId xmlns:p14="http://schemas.microsoft.com/office/powerpoint/2010/main" val="380726880"/>
+      </p:ext>
+    </p:extLst>
+  </p:cSld>
+  <p:clrMapOvr>
+    <a:masterClrMapping/>
   </p:clrMapOvr>
 </p:sld>
 </file>

</xml_diff>